<commit_message>
link to redd+ article added
</commit_message>
<xml_diff>
--- a/Notes/outline of ideas.pptx
+++ b/Notes/outline of ideas.pptx
@@ -250,7 +250,7 @@
           <a:p>
             <a:fld id="{BB86F1C3-4E0D-4EA1-AC40-508BD1BE2BEF}" type="datetimeFigureOut">
               <a:rPr lang="en-GB" smtClean="0"/>
-              <a:t>08/04/2021</a:t>
+              <a:t>16/04/2021</a:t>
             </a:fld>
             <a:endParaRPr lang="en-GB"/>
           </a:p>
@@ -420,7 +420,7 @@
           <a:p>
             <a:fld id="{BB86F1C3-4E0D-4EA1-AC40-508BD1BE2BEF}" type="datetimeFigureOut">
               <a:rPr lang="en-GB" smtClean="0"/>
-              <a:t>08/04/2021</a:t>
+              <a:t>16/04/2021</a:t>
             </a:fld>
             <a:endParaRPr lang="en-GB"/>
           </a:p>
@@ -600,7 +600,7 @@
           <a:p>
             <a:fld id="{BB86F1C3-4E0D-4EA1-AC40-508BD1BE2BEF}" type="datetimeFigureOut">
               <a:rPr lang="en-GB" smtClean="0"/>
-              <a:t>08/04/2021</a:t>
+              <a:t>16/04/2021</a:t>
             </a:fld>
             <a:endParaRPr lang="en-GB"/>
           </a:p>
@@ -770,7 +770,7 @@
           <a:p>
             <a:fld id="{BB86F1C3-4E0D-4EA1-AC40-508BD1BE2BEF}" type="datetimeFigureOut">
               <a:rPr lang="en-GB" smtClean="0"/>
-              <a:t>08/04/2021</a:t>
+              <a:t>16/04/2021</a:t>
             </a:fld>
             <a:endParaRPr lang="en-GB"/>
           </a:p>
@@ -1016,7 +1016,7 @@
           <a:p>
             <a:fld id="{BB86F1C3-4E0D-4EA1-AC40-508BD1BE2BEF}" type="datetimeFigureOut">
               <a:rPr lang="en-GB" smtClean="0"/>
-              <a:t>08/04/2021</a:t>
+              <a:t>16/04/2021</a:t>
             </a:fld>
             <a:endParaRPr lang="en-GB"/>
           </a:p>
@@ -1248,7 +1248,7 @@
           <a:p>
             <a:fld id="{BB86F1C3-4E0D-4EA1-AC40-508BD1BE2BEF}" type="datetimeFigureOut">
               <a:rPr lang="en-GB" smtClean="0"/>
-              <a:t>08/04/2021</a:t>
+              <a:t>16/04/2021</a:t>
             </a:fld>
             <a:endParaRPr lang="en-GB"/>
           </a:p>
@@ -1615,7 +1615,7 @@
           <a:p>
             <a:fld id="{BB86F1C3-4E0D-4EA1-AC40-508BD1BE2BEF}" type="datetimeFigureOut">
               <a:rPr lang="en-GB" smtClean="0"/>
-              <a:t>08/04/2021</a:t>
+              <a:t>16/04/2021</a:t>
             </a:fld>
             <a:endParaRPr lang="en-GB"/>
           </a:p>
@@ -1733,7 +1733,7 @@
           <a:p>
             <a:fld id="{BB86F1C3-4E0D-4EA1-AC40-508BD1BE2BEF}" type="datetimeFigureOut">
               <a:rPr lang="en-GB" smtClean="0"/>
-              <a:t>08/04/2021</a:t>
+              <a:t>16/04/2021</a:t>
             </a:fld>
             <a:endParaRPr lang="en-GB"/>
           </a:p>
@@ -1828,7 +1828,7 @@
           <a:p>
             <a:fld id="{BB86F1C3-4E0D-4EA1-AC40-508BD1BE2BEF}" type="datetimeFigureOut">
               <a:rPr lang="en-GB" smtClean="0"/>
-              <a:t>08/04/2021</a:t>
+              <a:t>16/04/2021</a:t>
             </a:fld>
             <a:endParaRPr lang="en-GB"/>
           </a:p>
@@ -2105,7 +2105,7 @@
           <a:p>
             <a:fld id="{BB86F1C3-4E0D-4EA1-AC40-508BD1BE2BEF}" type="datetimeFigureOut">
               <a:rPr lang="en-GB" smtClean="0"/>
-              <a:t>08/04/2021</a:t>
+              <a:t>16/04/2021</a:t>
             </a:fld>
             <a:endParaRPr lang="en-GB"/>
           </a:p>
@@ -2358,7 +2358,7 @@
           <a:p>
             <a:fld id="{BB86F1C3-4E0D-4EA1-AC40-508BD1BE2BEF}" type="datetimeFigureOut">
               <a:rPr lang="en-GB" smtClean="0"/>
-              <a:t>08/04/2021</a:t>
+              <a:t>16/04/2021</a:t>
             </a:fld>
             <a:endParaRPr lang="en-GB"/>
           </a:p>
@@ -2571,7 +2571,7 @@
           <a:p>
             <a:fld id="{BB86F1C3-4E0D-4EA1-AC40-508BD1BE2BEF}" type="datetimeFigureOut">
               <a:rPr lang="en-GB" smtClean="0"/>
-              <a:t>08/04/2021</a:t>
+              <a:t>16/04/2021</a:t>
             </a:fld>
             <a:endParaRPr lang="en-GB"/>
           </a:p>
@@ -8598,7 +8598,7 @@
         </p:nvSpPr>
         <p:spPr>
           <a:xfrm>
-            <a:off x="7392473" y="4997003"/>
+            <a:off x="7164542" y="4203959"/>
             <a:ext cx="3348507" cy="369332"/>
           </a:xfrm>
           <a:prstGeom prst="rect">
@@ -8615,6 +8615,41 @@
             <a:r>
               <a:rPr lang="en-GB" b="1" dirty="0"/>
               <a:t>REDD+</a:t>
+            </a:r>
+          </a:p>
+        </p:txBody>
+      </p:sp>
+      <p:sp>
+        <p:nvSpPr>
+          <p:cNvPr id="3" name="TextBox 2">
+            <a:extLst>
+              <a:ext uri="{FF2B5EF4-FFF2-40B4-BE49-F238E27FC236}">
+                <a16:creationId xmlns:a16="http://schemas.microsoft.com/office/drawing/2014/main" id="{2835304A-EB25-46CB-93D5-CAE8AAAA17A1}"/>
+              </a:ext>
+            </a:extLst>
+          </p:cNvPr>
+          <p:cNvSpPr txBox="1"/>
+          <p:nvPr/>
+        </p:nvSpPr>
+        <p:spPr>
+          <a:xfrm>
+            <a:off x="6185677" y="5075871"/>
+            <a:ext cx="4607660" cy="923330"/>
+          </a:xfrm>
+          <a:prstGeom prst="rect">
+            <a:avLst/>
+          </a:prstGeom>
+          <a:noFill/>
+        </p:spPr>
+        <p:txBody>
+          <a:bodyPr wrap="square" rtlCol="0">
+            <a:spAutoFit/>
+          </a:bodyPr>
+          <a:lstStyle/>
+          <a:p>
+            <a:r>
+              <a:rPr lang="en-GB" dirty="0"/>
+              <a:t>https://news.mongabay.com/2021/04/as-cop26-looms-and-tropical-deforestation-soars-redd-debate-roars-on/</a:t>
             </a:r>
           </a:p>
         </p:txBody>

</xml_diff>